<commit_message>
Minor slide updates, up to lecture 3.
</commit_message>
<xml_diff>
--- a/doc/advanced/slides/lesson_03.pptx
+++ b/doc/advanced/slides/lesson_03.pptx
@@ -225,7 +225,7 @@
           <a:p>
             <a:fld id="{9B5B52BA-3295-0343-9E28-A260A811DD10}" type="datetimeFigureOut">
               <a:rPr lang="en-US" smtClean="0"/>
-              <a:t>8/3/19</a:t>
+              <a:t>8/31/21</a:t>
             </a:fld>
             <a:endParaRPr lang="en-US"/>
           </a:p>
@@ -621,7 +621,7 @@
           <a:p>
             <a:fld id="{04F1D4A2-813C-F741-B481-C92B3A596030}" type="datetimeFigureOut">
               <a:rPr lang="en-US" smtClean="0"/>
-              <a:t>8/3/19</a:t>
+              <a:t>8/31/21</a:t>
             </a:fld>
             <a:endParaRPr lang="en-US"/>
           </a:p>
@@ -789,7 +789,7 @@
           <a:p>
             <a:fld id="{04F1D4A2-813C-F741-B481-C92B3A596030}" type="datetimeFigureOut">
               <a:rPr lang="en-US" smtClean="0"/>
-              <a:t>8/3/19</a:t>
+              <a:t>8/31/21</a:t>
             </a:fld>
             <a:endParaRPr lang="en-US"/>
           </a:p>
@@ -967,7 +967,7 @@
           <a:p>
             <a:fld id="{04F1D4A2-813C-F741-B481-C92B3A596030}" type="datetimeFigureOut">
               <a:rPr lang="en-US" smtClean="0"/>
-              <a:t>8/3/19</a:t>
+              <a:t>8/31/21</a:t>
             </a:fld>
             <a:endParaRPr lang="en-US"/>
           </a:p>
@@ -1304,7 +1304,7 @@
           <a:p>
             <a:fld id="{04F1D4A2-813C-F741-B481-C92B3A596030}" type="datetimeFigureOut">
               <a:rPr lang="en-US" smtClean="0"/>
-              <a:t>8/3/19</a:t>
+              <a:t>8/31/21</a:t>
             </a:fld>
             <a:endParaRPr lang="en-US"/>
           </a:p>
@@ -1549,7 +1549,7 @@
           <a:p>
             <a:fld id="{04F1D4A2-813C-F741-B481-C92B3A596030}" type="datetimeFigureOut">
               <a:rPr lang="en-US" smtClean="0"/>
-              <a:t>8/3/19</a:t>
+              <a:t>8/31/21</a:t>
             </a:fld>
             <a:endParaRPr lang="en-US"/>
           </a:p>
@@ -1778,7 +1778,7 @@
           <a:p>
             <a:fld id="{04F1D4A2-813C-F741-B481-C92B3A596030}" type="datetimeFigureOut">
               <a:rPr lang="en-US" smtClean="0"/>
-              <a:t>8/3/19</a:t>
+              <a:t>8/31/21</a:t>
             </a:fld>
             <a:endParaRPr lang="en-US"/>
           </a:p>
@@ -2142,7 +2142,7 @@
           <a:p>
             <a:fld id="{04F1D4A2-813C-F741-B481-C92B3A596030}" type="datetimeFigureOut">
               <a:rPr lang="en-US" smtClean="0"/>
-              <a:t>8/3/19</a:t>
+              <a:t>8/31/21</a:t>
             </a:fld>
             <a:endParaRPr lang="en-US"/>
           </a:p>
@@ -2259,7 +2259,7 @@
           <a:p>
             <a:fld id="{04F1D4A2-813C-F741-B481-C92B3A596030}" type="datetimeFigureOut">
               <a:rPr lang="en-US" smtClean="0"/>
-              <a:t>8/3/19</a:t>
+              <a:t>8/31/21</a:t>
             </a:fld>
             <a:endParaRPr lang="en-US"/>
           </a:p>
@@ -2354,7 +2354,7 @@
           <a:p>
             <a:fld id="{04F1D4A2-813C-F741-B481-C92B3A596030}" type="datetimeFigureOut">
               <a:rPr lang="en-US" smtClean="0"/>
-              <a:t>8/3/19</a:t>
+              <a:t>8/31/21</a:t>
             </a:fld>
             <a:endParaRPr lang="en-US"/>
           </a:p>
@@ -2629,7 +2629,7 @@
           <a:p>
             <a:fld id="{04F1D4A2-813C-F741-B481-C92B3A596030}" type="datetimeFigureOut">
               <a:rPr lang="en-US" smtClean="0"/>
-              <a:t>8/3/19</a:t>
+              <a:t>8/31/21</a:t>
             </a:fld>
             <a:endParaRPr lang="en-US"/>
           </a:p>
@@ -2881,7 +2881,7 @@
           <a:p>
             <a:fld id="{04F1D4A2-813C-F741-B481-C92B3A596030}" type="datetimeFigureOut">
               <a:rPr lang="en-US" smtClean="0"/>
-              <a:t>8/3/19</a:t>
+              <a:t>8/31/21</a:t>
             </a:fld>
             <a:endParaRPr lang="en-US"/>
           </a:p>
@@ -3092,7 +3092,7 @@
           <a:p>
             <a:fld id="{04F1D4A2-813C-F741-B481-C92B3A596030}" type="datetimeFigureOut">
               <a:rPr lang="en-US" smtClean="0"/>
-              <a:t>8/3/19</a:t>
+              <a:t>8/31/21</a:t>
             </a:fld>
             <a:endParaRPr lang="en-US"/>
           </a:p>
@@ -3523,15 +3523,7 @@
             <a:pPr algn="l"/>
             <a:r>
               <a:rPr lang="en-US" dirty="0"/>
-              <a:t>Enterprise </a:t>
-            </a:r>
-            <a:r>
-              <a:rPr lang="en-US" dirty="0" err="1"/>
-              <a:t>Programmering</a:t>
-            </a:r>
-            <a:r>
-              <a:rPr lang="en-US" dirty="0"/>
-              <a:t> 2</a:t>
+              <a:t>Enterprise Programming 2</a:t>
             </a:r>
             <a:br>
               <a:rPr lang="en-US" dirty="0"/>
@@ -3578,11 +3570,11 @@
             <a:pPr algn="r"/>
             <a:r>
               <a:rPr lang="en-US" dirty="0"/>
-              <a:t>Prof. Andrea </a:t>
+              <a:t>Bogdan </a:t>
             </a:r>
             <a:r>
               <a:rPr lang="en-US" dirty="0" err="1"/>
-              <a:t>Arcuri</a:t>
+              <a:t>Marculescu</a:t>
             </a:r>
             <a:endParaRPr lang="en-US" dirty="0"/>
           </a:p>

</xml_diff>